<commit_message>
minor changes in PPT completed final
</commit_message>
<xml_diff>
--- a/SFMS PPT.pptx
+++ b/SFMS PPT.pptx
@@ -10356,7 +10356,18 @@
             </a:r>
             <a:r>
               <a:rPr lang="en-US" sz="1200" dirty="0"/>
-              <a:t>This module allows administrator to registration the details of new students and the creation of their profiles.</a:t>
+              <a:t>This module allows administrator to register the details of new students and check dues of students.</a:t>
+            </a:r>
+          </a:p>
+          <a:p>
+            <a:pPr lvl="1"/>
+            <a:r>
+              <a:rPr lang="en-US" sz="1000" b="1" dirty="0"/>
+              <a:t>Add student:</a:t>
+            </a:r>
+            <a:r>
+              <a:rPr lang="en-US" sz="1000" dirty="0"/>
+              <a:t> This sub module give an option to add student details.</a:t>
             </a:r>
           </a:p>
           <a:p>
@@ -10377,17 +10388,7 @@
             </a:r>
             <a:r>
               <a:rPr lang="en-US" sz="1200" dirty="0"/>
-              <a:t>This module gives the payment detail from all the other modules</a:t>
-            </a:r>
-          </a:p>
-          <a:p>
-            <a:r>
-              <a:rPr lang="en-US" sz="1200" b="1" dirty="0"/>
-              <a:t>Report module: </a:t>
-            </a:r>
-            <a:r>
-              <a:rPr lang="en-US" sz="1200" dirty="0"/>
-              <a:t>This module generates reports on fee collections, outstanding fees, and other related data.</a:t>
+              <a:t>This module gives the payment details of student by checking all the table.</a:t>
             </a:r>
           </a:p>
         </p:txBody>
@@ -10410,8 +10411,8 @@
         </p:nvSpPr>
         <p:spPr>
           <a:xfrm>
-            <a:off x="8365776" y="2810791"/>
-            <a:ext cx="3211288" cy="3545560"/>
+            <a:off x="8365776" y="1972235"/>
+            <a:ext cx="3211288" cy="4384116"/>
           </a:xfrm>
         </p:spPr>
         <p:txBody>
@@ -10422,6 +10423,16 @@
           <a:p>
             <a:r>
               <a:rPr lang="en-US" sz="1200" b="1" dirty="0"/>
+              <a:t>Report module: </a:t>
+            </a:r>
+            <a:r>
+              <a:rPr lang="en-US" sz="1200" dirty="0"/>
+              <a:t>This module generates reports on fee collections, outstanding fees, and other related data.</a:t>
+            </a:r>
+          </a:p>
+          <a:p>
+            <a:r>
+              <a:rPr lang="en-US" sz="1200" b="1" dirty="0"/>
               <a:t>Fee receipt generation process : </a:t>
             </a:r>
             <a:r>
@@ -10436,7 +10447,7 @@
             </a:r>
             <a:r>
               <a:rPr lang="en-US" sz="1200" dirty="0"/>
-              <a:t>This table gives the structure of student details.</a:t>
+              <a:t>This table shows the details of students.</a:t>
             </a:r>
           </a:p>
           <a:p>
@@ -10446,7 +10457,7 @@
             </a:r>
             <a:r>
               <a:rPr lang="en-US" sz="1200" dirty="0"/>
-              <a:t>This table gives the structure of fee detail to pay the bill by the users.</a:t>
+              <a:t>This table shows the fee structure of school.</a:t>
             </a:r>
           </a:p>
           <a:p>
@@ -14423,7 +14434,7 @@
         </p:nvSpPr>
         <p:spPr>
           <a:xfrm>
-            <a:off x="6680421" y="4689989"/>
+            <a:off x="6581806" y="4689989"/>
             <a:ext cx="2913230" cy="163471"/>
           </a:xfrm>
           <a:prstGeom prst="homePlate">
@@ -14437,6 +14448,13 @@
           <a:ln>
             <a:noFill/>
           </a:ln>
+          <a:scene3d>
+            <a:camera prst="orthographicFront"/>
+            <a:lightRig rig="threePt" dir="t"/>
+          </a:scene3d>
+          <a:sp3d>
+            <a:bevelT/>
+          </a:sp3d>
         </p:spPr>
         <p:txBody>
           <a:bodyPr spcFirstLastPara="1" wrap="square" lIns="91425" tIns="45700" rIns="91425" bIns="45700" anchor="ctr" anchorCtr="0">
@@ -14465,7 +14483,7 @@
         </p:nvSpPr>
         <p:spPr>
           <a:xfrm>
-            <a:off x="3834099" y="5147270"/>
+            <a:off x="3825134" y="5147270"/>
             <a:ext cx="5692645" cy="157306"/>
           </a:xfrm>
           <a:prstGeom prst="homePlate">
@@ -14479,6 +14497,13 @@
           <a:ln>
             <a:noFill/>
           </a:ln>
+          <a:scene3d>
+            <a:camera prst="orthographicFront"/>
+            <a:lightRig rig="threePt" dir="t"/>
+          </a:scene3d>
+          <a:sp3d>
+            <a:bevelT/>
+          </a:sp3d>
         </p:spPr>
         <p:txBody>
           <a:bodyPr spcFirstLastPara="1" wrap="square" lIns="91425" tIns="45700" rIns="91425" bIns="45700" anchor="ctr" anchorCtr="0">
@@ -14521,6 +14546,13 @@
           <a:ln>
             <a:noFill/>
           </a:ln>
+          <a:scene3d>
+            <a:camera prst="orthographicFront"/>
+            <a:lightRig rig="threePt" dir="t"/>
+          </a:scene3d>
+          <a:sp3d>
+            <a:bevelT/>
+          </a:sp3d>
         </p:spPr>
         <p:txBody>
           <a:bodyPr spcFirstLastPara="1" wrap="square" lIns="91425" tIns="45700" rIns="91425" bIns="45700" anchor="ctr" anchorCtr="0">
@@ -14563,6 +14595,13 @@
           <a:ln>
             <a:noFill/>
           </a:ln>
+          <a:scene3d>
+            <a:camera prst="orthographicFront"/>
+            <a:lightRig rig="threePt" dir="t"/>
+          </a:scene3d>
+          <a:sp3d>
+            <a:bevelT/>
+          </a:sp3d>
         </p:spPr>
         <p:txBody>
           <a:bodyPr spcFirstLastPara="1" wrap="square" lIns="91425" tIns="45700" rIns="91425" bIns="45700" anchor="ctr" anchorCtr="0">
@@ -14672,7 +14711,7 @@
         </p:nvSpPr>
         <p:spPr>
           <a:xfrm>
-            <a:off x="4590393" y="2868501"/>
+            <a:off x="4590393" y="2865445"/>
             <a:ext cx="770501" cy="113082"/>
           </a:xfrm>
           <a:prstGeom prst="homePlate">
@@ -14686,6 +14725,13 @@
           <a:ln>
             <a:noFill/>
           </a:ln>
+          <a:scene3d>
+            <a:camera prst="orthographicFront"/>
+            <a:lightRig rig="threePt" dir="t"/>
+          </a:scene3d>
+          <a:sp3d>
+            <a:bevelT/>
+          </a:sp3d>
         </p:spPr>
         <p:txBody>
           <a:bodyPr spcFirstLastPara="1" wrap="square" lIns="91425" tIns="45700" rIns="91425" bIns="45700" anchor="ctr" anchorCtr="0">
@@ -14728,6 +14774,13 @@
           <a:ln>
             <a:noFill/>
           </a:ln>
+          <a:scene3d>
+            <a:camera prst="orthographicFront"/>
+            <a:lightRig rig="threePt" dir="t"/>
+          </a:scene3d>
+          <a:sp3d>
+            <a:bevelT/>
+          </a:sp3d>
         </p:spPr>
         <p:txBody>
           <a:bodyPr spcFirstLastPara="1" wrap="square" lIns="91425" tIns="45700" rIns="91425" bIns="45700" anchor="ctr" anchorCtr="0">
@@ -14770,6 +14823,13 @@
           <a:ln>
             <a:noFill/>
           </a:ln>
+          <a:scene3d>
+            <a:camera prst="orthographicFront"/>
+            <a:lightRig rig="threePt" dir="t"/>
+          </a:scene3d>
+          <a:sp3d>
+            <a:bevelT/>
+          </a:sp3d>
         </p:spPr>
         <p:txBody>
           <a:bodyPr spcFirstLastPara="1" wrap="square" lIns="91425" tIns="45700" rIns="91425" bIns="45700" anchor="ctr" anchorCtr="0">
@@ -14889,6 +14949,13 @@
           <a:ln>
             <a:noFill/>
           </a:ln>
+          <a:scene3d>
+            <a:camera prst="orthographicFront"/>
+            <a:lightRig rig="threePt" dir="t"/>
+          </a:scene3d>
+          <a:sp3d>
+            <a:bevelT/>
+          </a:sp3d>
         </p:spPr>
         <p:txBody>
           <a:bodyPr spcFirstLastPara="1" wrap="square" lIns="91425" tIns="45700" rIns="91425" bIns="45700" anchor="ctr" anchorCtr="0">
@@ -14924,7 +14991,7 @@
         </p:blipFill>
         <p:spPr>
           <a:xfrm>
-            <a:off x="9519056" y="4543124"/>
+            <a:off x="9483196" y="4543124"/>
             <a:ext cx="457200" cy="457200"/>
           </a:xfrm>
           <a:prstGeom prst="rect">
@@ -17091,14 +17158,14 @@
             <p:ph idx="4294967295"/>
             <p:extLst>
               <p:ext uri="{D42A27DB-BD31-4B8C-83A1-F6EECF244321}">
-                <p14:modId xmlns:p14="http://schemas.microsoft.com/office/powerpoint/2010/main" val="2328664319"/>
+                <p14:modId xmlns:p14="http://schemas.microsoft.com/office/powerpoint/2010/main" val="2287997636"/>
               </p:ext>
             </p:extLst>
           </p:nvPr>
         </p:nvGraphicFramePr>
         <p:xfrm>
           <a:off x="3210853" y="776189"/>
-          <a:ext cx="8173158" cy="5822124"/>
+          <a:ext cx="8173158" cy="5791176"/>
         </p:xfrm>
         <a:graphic>
           <a:graphicData uri="http://schemas.openxmlformats.org/drawingml/2006/table">
@@ -17676,17 +17743,6 @@
                         <a:defRPr/>
                       </a:pPr>
                       <a:r>
-                        <a:rPr lang="en-US" sz="1400" b="0" i="0" dirty="0">
-                          <a:solidFill>
-                            <a:schemeClr val="dk1"/>
-                          </a:solidFill>
-                          <a:latin typeface="+mn-lt"/>
-                          <a:ea typeface="+mn-ea"/>
-                          <a:cs typeface="+mn-cs"/>
-                        </a:rPr>
-                        <a:t>TOTAL</a:t>
-                      </a:r>
-                      <a:r>
                         <a:rPr lang="en-US" sz="1400" b="0" i="0" baseline="0" dirty="0">
                           <a:solidFill>
                             <a:schemeClr val="dk1"/>
@@ -17695,7 +17751,7 @@
                           <a:ea typeface="+mn-ea"/>
                           <a:cs typeface="+mn-cs"/>
                         </a:rPr>
-                        <a:t> DAYS + 40% = 73 DAYS</a:t>
+                        <a:t>TIME TAKEN = 73 DAYS</a:t>
                       </a:r>
                       <a:endParaRPr lang="ru-RU" sz="1400" b="0" i="0" dirty="0">
                         <a:solidFill>
@@ -17892,17 +17948,6 @@
                         <a:defRPr/>
                       </a:pPr>
                       <a:r>
-                        <a:rPr lang="en-US" sz="1400" b="0" i="0" dirty="0">
-                          <a:solidFill>
-                            <a:schemeClr val="dk1"/>
-                          </a:solidFill>
-                          <a:latin typeface="+mn-lt"/>
-                          <a:ea typeface="+mn-ea"/>
-                          <a:cs typeface="+mn-cs"/>
-                        </a:rPr>
-                        <a:t>TOTAL</a:t>
-                      </a:r>
-                      <a:r>
                         <a:rPr lang="en-US" sz="1400" b="0" i="0" baseline="0" dirty="0">
                           <a:solidFill>
                             <a:schemeClr val="dk1"/>
@@ -17911,7 +17956,7 @@
                           <a:ea typeface="+mn-ea"/>
                           <a:cs typeface="+mn-cs"/>
                         </a:rPr>
-                        <a:t> DAYS + 15% = 27 DAYS</a:t>
+                        <a:t>TIME TAKEN = 27 DAYS</a:t>
                       </a:r>
                       <a:endParaRPr lang="ru-RU" sz="1400" b="0" i="0" dirty="0">
                         <a:solidFill>
@@ -18162,17 +18207,6 @@
                         <a:defRPr/>
                       </a:pPr>
                       <a:r>
-                        <a:rPr lang="en-US" sz="1400" b="0" i="0" dirty="0">
-                          <a:solidFill>
-                            <a:schemeClr val="dk1"/>
-                          </a:solidFill>
-                          <a:latin typeface="+mn-lt"/>
-                          <a:ea typeface="+mn-ea"/>
-                          <a:cs typeface="+mn-cs"/>
-                        </a:rPr>
-                        <a:t>TOTAL</a:t>
-                      </a:r>
-                      <a:r>
                         <a:rPr lang="en-US" sz="1400" b="0" i="0" baseline="0" dirty="0">
                           <a:solidFill>
                             <a:schemeClr val="dk1"/>
@@ -18181,7 +18215,7 @@
                           <a:ea typeface="+mn-ea"/>
                           <a:cs typeface="+mn-cs"/>
                         </a:rPr>
-                        <a:t> DAYS + 25% =47 DAYS</a:t>
+                        <a:t>TIME TAKEN =47 DAYS</a:t>
                       </a:r>
                       <a:endParaRPr lang="ru-RU" sz="1400" b="0" i="0" dirty="0">
                         <a:solidFill>
@@ -18251,33 +18285,6 @@
                   <a:txBody>
                     <a:bodyPr/>
                     <a:lstStyle/>
-                    <a:p>
-                      <a:pPr marL="0" marR="0" indent="0" algn="ctr" defTabSz="1371600" rtl="0" eaLnBrk="1" fontAlgn="auto" latinLnBrk="0" hangingPunct="1">
-                        <a:lnSpc>
-                          <a:spcPct val="100000"/>
-                        </a:lnSpc>
-                        <a:spcBef>
-                          <a:spcPts val="0"/>
-                        </a:spcBef>
-                        <a:spcAft>
-                          <a:spcPts val="0"/>
-                        </a:spcAft>
-                        <a:buClrTx/>
-                        <a:buSzTx/>
-                        <a:buFontTx/>
-                        <a:buNone/>
-                        <a:tabLst/>
-                        <a:defRPr/>
-                      </a:pPr>
-                      <a:endParaRPr lang="en-US" sz="1400" b="0" i="0" baseline="0" dirty="0">
-                        <a:solidFill>
-                          <a:schemeClr val="tx1"/>
-                        </a:solidFill>
-                        <a:latin typeface="Gill Sans Light" panose="020B0302020104020203" pitchFamily="34" charset="-79"/>
-                        <a:ea typeface="Roboto Light" panose="02000000000000000000" pitchFamily="2" charset="0"/>
-                        <a:cs typeface="Gill Sans Light" panose="020B0302020104020203"/>
-                      </a:endParaRPr>
-                    </a:p>
                     <a:p>
                       <a:pPr marL="0" marR="0" indent="0" algn="ctr" defTabSz="1371600" rtl="0" eaLnBrk="1" fontAlgn="auto" latinLnBrk="0" hangingPunct="1">
                         <a:lnSpc>
@@ -18383,17 +18390,6 @@
                         <a:defRPr/>
                       </a:pPr>
                       <a:r>
-                        <a:rPr lang="en-US" sz="1400" b="0" i="0" dirty="0">
-                          <a:solidFill>
-                            <a:schemeClr val="dk1"/>
-                          </a:solidFill>
-                          <a:latin typeface="+mn-lt"/>
-                          <a:ea typeface="+mn-ea"/>
-                          <a:cs typeface="+mn-cs"/>
-                        </a:rPr>
-                        <a:t>TOTAL</a:t>
-                      </a:r>
-                      <a:r>
                         <a:rPr lang="en-US" sz="1400" b="0" i="0" baseline="0" dirty="0">
                           <a:solidFill>
                             <a:schemeClr val="dk1"/>
@@ -18402,7 +18398,7 @@
                           <a:ea typeface="+mn-ea"/>
                           <a:cs typeface="+mn-cs"/>
                         </a:rPr>
-                        <a:t> DAYS + 15% = 24 DAYS</a:t>
+                        <a:t>TIME TAKEN = 24 DAYS</a:t>
                       </a:r>
                       <a:endParaRPr lang="ru-RU" sz="1400" b="0" i="0" dirty="0">
                         <a:solidFill>
@@ -18656,17 +18652,6 @@
                         <a:defRPr/>
                       </a:pPr>
                       <a:r>
-                        <a:rPr lang="en-US" sz="1400" b="0" i="0" dirty="0">
-                          <a:solidFill>
-                            <a:schemeClr val="dk1"/>
-                          </a:solidFill>
-                          <a:latin typeface="+mn-lt"/>
-                          <a:ea typeface="+mn-ea"/>
-                          <a:cs typeface="+mn-cs"/>
-                        </a:rPr>
-                        <a:t>TOTAL</a:t>
-                      </a:r>
-                      <a:r>
                         <a:rPr lang="en-US" sz="1400" b="0" i="0" baseline="0" dirty="0">
                           <a:solidFill>
                             <a:schemeClr val="dk1"/>
@@ -18675,7 +18660,7 @@
                           <a:ea typeface="+mn-ea"/>
                           <a:cs typeface="+mn-cs"/>
                         </a:rPr>
-                        <a:t> DAYS +5% = 11 DAYS</a:t>
+                        <a:t>TIME TAKEN = 11 DAYS</a:t>
                       </a:r>
                       <a:endParaRPr lang="ru-RU" sz="1400" b="0" i="0" dirty="0">
                         <a:solidFill>
@@ -19675,11 +19660,11 @@
             </a:pPr>
             <a:r>
               <a:rPr lang="en-US" b="1" dirty="0"/>
-              <a:t>Integration with other school management system:- </a:t>
+              <a:t>Integration with other school management system software:- </a:t>
             </a:r>
             <a:r>
               <a:rPr lang="en-US" dirty="0"/>
-              <a:t>The school fees management system can be integrated with other school management systems like attendance management , grade management, and student information management. This will help schools to have a complete overview of the operations and make informed decisions.</a:t>
+              <a:t>The school fees management system can be integrated with other school management systems like attendance management , grade management, and more. This will help schools to have a complete overview of the operations and make informed decisions.</a:t>
             </a:r>
           </a:p>
           <a:p>

</xml_diff>